<commit_message>
Usunięto przekreślony, zbędny tekst
</commit_message>
<xml_diff>
--- a/Wprowadzenie do algorytmów/III. Wprowadzenie do algorytmów/Metoda lewej ręki.pptx
+++ b/Wprowadzenie do algorytmów/III. Wprowadzenie do algorytmów/Metoda lewej ręki.pptx
@@ -241,7 +241,7 @@
             <a:fld id="{EB805E2A-9810-454C-B7D3-8470ADBDD20E}" type="datetimeFigureOut">
               <a:rPr lang="pl-PL" smtClean="0"/>
               <a:pPr/>
-              <a:t>07.05.2018</a:t>
+              <a:t>11.11.2018</a:t>
             </a:fld>
             <a:endParaRPr lang="pl-PL"/>
           </a:p>
@@ -1000,7 +1000,7 @@
             <a:fld id="{6F059BED-48B2-4440-8476-F4EA9B94403E}" type="datetimeFigureOut">
               <a:rPr lang="pl-PL" smtClean="0"/>
               <a:pPr/>
-              <a:t>07.05.2018</a:t>
+              <a:t>11.11.2018</a:t>
             </a:fld>
             <a:endParaRPr lang="pl-PL"/>
           </a:p>
@@ -1200,7 +1200,7 @@
             <a:fld id="{6F059BED-48B2-4440-8476-F4EA9B94403E}" type="datetimeFigureOut">
               <a:rPr lang="pl-PL" smtClean="0"/>
               <a:pPr/>
-              <a:t>07.05.2018</a:t>
+              <a:t>11.11.2018</a:t>
             </a:fld>
             <a:endParaRPr lang="pl-PL"/>
           </a:p>
@@ -1410,7 +1410,7 @@
             <a:fld id="{6F059BED-48B2-4440-8476-F4EA9B94403E}" type="datetimeFigureOut">
               <a:rPr lang="pl-PL" smtClean="0"/>
               <a:pPr/>
-              <a:t>07.05.2018</a:t>
+              <a:t>11.11.2018</a:t>
             </a:fld>
             <a:endParaRPr lang="pl-PL"/>
           </a:p>
@@ -1610,7 +1610,7 @@
             <a:fld id="{6F059BED-48B2-4440-8476-F4EA9B94403E}" type="datetimeFigureOut">
               <a:rPr lang="pl-PL" smtClean="0"/>
               <a:pPr/>
-              <a:t>07.05.2018</a:t>
+              <a:t>11.11.2018</a:t>
             </a:fld>
             <a:endParaRPr lang="pl-PL"/>
           </a:p>
@@ -1887,7 +1887,7 @@
             <a:fld id="{6F059BED-48B2-4440-8476-F4EA9B94403E}" type="datetimeFigureOut">
               <a:rPr lang="pl-PL" smtClean="0"/>
               <a:pPr/>
-              <a:t>07.05.2018</a:t>
+              <a:t>11.11.2018</a:t>
             </a:fld>
             <a:endParaRPr lang="pl-PL"/>
           </a:p>
@@ -2154,7 +2154,7 @@
             <a:fld id="{6F059BED-48B2-4440-8476-F4EA9B94403E}" type="datetimeFigureOut">
               <a:rPr lang="pl-PL" smtClean="0"/>
               <a:pPr/>
-              <a:t>07.05.2018</a:t>
+              <a:t>11.11.2018</a:t>
             </a:fld>
             <a:endParaRPr lang="pl-PL"/>
           </a:p>
@@ -2568,7 +2568,7 @@
             <a:fld id="{6F059BED-48B2-4440-8476-F4EA9B94403E}" type="datetimeFigureOut">
               <a:rPr lang="pl-PL" smtClean="0"/>
               <a:pPr/>
-              <a:t>07.05.2018</a:t>
+              <a:t>11.11.2018</a:t>
             </a:fld>
             <a:endParaRPr lang="pl-PL"/>
           </a:p>
@@ -2711,7 +2711,7 @@
             <a:fld id="{6F059BED-48B2-4440-8476-F4EA9B94403E}" type="datetimeFigureOut">
               <a:rPr lang="pl-PL" smtClean="0"/>
               <a:pPr/>
-              <a:t>07.05.2018</a:t>
+              <a:t>11.11.2018</a:t>
             </a:fld>
             <a:endParaRPr lang="pl-PL"/>
           </a:p>
@@ -2826,7 +2826,7 @@
             <a:fld id="{6F059BED-48B2-4440-8476-F4EA9B94403E}" type="datetimeFigureOut">
               <a:rPr lang="pl-PL" smtClean="0"/>
               <a:pPr/>
-              <a:t>07.05.2018</a:t>
+              <a:t>11.11.2018</a:t>
             </a:fld>
             <a:endParaRPr lang="pl-PL"/>
           </a:p>
@@ -3139,7 +3139,7 @@
             <a:fld id="{6F059BED-48B2-4440-8476-F4EA9B94403E}" type="datetimeFigureOut">
               <a:rPr lang="pl-PL" smtClean="0"/>
               <a:pPr/>
-              <a:t>07.05.2018</a:t>
+              <a:t>11.11.2018</a:t>
             </a:fld>
             <a:endParaRPr lang="pl-PL"/>
           </a:p>
@@ -3429,7 +3429,7 @@
             <a:fld id="{6F059BED-48B2-4440-8476-F4EA9B94403E}" type="datetimeFigureOut">
               <a:rPr lang="pl-PL" smtClean="0"/>
               <a:pPr/>
-              <a:t>07.05.2018</a:t>
+              <a:t>11.11.2018</a:t>
             </a:fld>
             <a:endParaRPr lang="pl-PL"/>
           </a:p>
@@ -3672,7 +3672,7 @@
             <a:fld id="{6F059BED-48B2-4440-8476-F4EA9B94403E}" type="datetimeFigureOut">
               <a:rPr lang="pl-PL" smtClean="0"/>
               <a:pPr/>
-              <a:t>07.05.2018</a:t>
+              <a:t>11.11.2018</a:t>
             </a:fld>
             <a:endParaRPr lang="pl-PL"/>
           </a:p>
@@ -10096,7 +10096,7 @@
         </p:spPr>
         <p:txBody>
           <a:bodyPr>
-            <a:normAutofit fontScale="92500"/>
+            <a:normAutofit/>
           </a:bodyPr>
           <a:lstStyle/>
           <a:p>
@@ -10121,12 +10121,6 @@
             <a:r>
               <a:rPr lang="pl-PL" dirty="0"/>
               <a:t>Poruszamy się tak, by nie odrywać ręki od ściany. Z tego wynika, że dozwolone są tylko dwie akcje – krok naprzód i obrót o 90 stopni.</a:t>
-            </a:r>
-          </a:p>
-          <a:p>
-            <a:r>
-              <a:rPr lang="pl-PL" strike="sngStrike" dirty="0"/>
-              <a:t>Jeżeli labirynt jest spójny (zbudowany z jednego muru), to zawsze znajdziemy wyjście.</a:t>
             </a:r>
           </a:p>
         </p:txBody>

</xml_diff>